<commit_message>
Update migration process to create active folios for leases
</commit_message>
<xml_diff>
--- a/Crown Land Migration Process.pptx
+++ b/Crown Land Migration Process.pptx
@@ -5798,8 +5798,65 @@
                 <a:ea typeface="Roboto" panose="02000000000000000000" pitchFamily="2" charset="0"/>
                 <a:cs typeface="Roboto" panose="02000000000000000000" pitchFamily="2" charset="0"/>
               </a:rPr>
-              <a:t>Check if land has a </a:t>
-            </a:r>
+              <a:t>Check if land has a government road</a:t>
+            </a:r>
+          </a:p>
+        </p:txBody>
+      </p:sp>
+      <p:sp>
+        <p:nvSpPr>
+          <p:cNvPr id="101" name="Rounded Rectangle 100"/>
+          <p:cNvSpPr/>
+          <p:nvPr/>
+        </p:nvSpPr>
+        <p:spPr>
+          <a:xfrm>
+            <a:off x="3548620" y="5648215"/>
+            <a:ext cx="2340000" cy="396000"/>
+          </a:xfrm>
+          <a:prstGeom prst="roundRect">
+            <a:avLst/>
+          </a:prstGeom>
+          <a:solidFill>
+            <a:schemeClr val="bg1"/>
+          </a:solidFill>
+          <a:ln w="12700">
+            <a:solidFill>
+              <a:schemeClr val="tx1">
+                <a:lumMod val="65000"/>
+                <a:lumOff val="35000"/>
+              </a:schemeClr>
+            </a:solidFill>
+          </a:ln>
+          <a:effectLst>
+            <a:outerShdw blurRad="50800" dist="38100" dir="2700000" algn="tl" rotWithShape="0">
+              <a:prstClr val="black">
+                <a:alpha val="40000"/>
+              </a:prstClr>
+            </a:outerShdw>
+          </a:effectLst>
+        </p:spPr>
+        <p:style>
+          <a:lnRef idx="2">
+            <a:schemeClr val="accent1">
+              <a:shade val="50000"/>
+            </a:schemeClr>
+          </a:lnRef>
+          <a:fillRef idx="1">
+            <a:schemeClr val="accent1"/>
+          </a:fillRef>
+          <a:effectRef idx="0">
+            <a:schemeClr val="accent1"/>
+          </a:effectRef>
+          <a:fontRef idx="minor">
+            <a:schemeClr val="lt1"/>
+          </a:fontRef>
+        </p:style>
+        <p:txBody>
+          <a:bodyPr rtlCol="0" anchor="ctr"/>
+          <a:lstStyle/>
+          <a:p>
+            <a:pPr algn="ctr"/>
             <a:r>
               <a:rPr lang="en-AU" sz="1100" dirty="0" smtClean="0">
                 <a:solidFill>
@@ -5809,103 +5866,8 @@
                 <a:ea typeface="Roboto" panose="02000000000000000000" pitchFamily="2" charset="0"/>
                 <a:cs typeface="Roboto" panose="02000000000000000000" pitchFamily="2" charset="0"/>
               </a:rPr>
-              <a:t>government road</a:t>
-            </a:r>
-            <a:endParaRPr lang="en-AU" sz="1100" dirty="0" smtClean="0">
-              <a:solidFill>
-                <a:schemeClr val="tx1"/>
-              </a:solidFill>
-              <a:latin typeface="Roboto" panose="02000000000000000000" pitchFamily="2" charset="0"/>
-              <a:ea typeface="Roboto" panose="02000000000000000000" pitchFamily="2" charset="0"/>
-              <a:cs typeface="Roboto" panose="02000000000000000000" pitchFamily="2" charset="0"/>
-            </a:endParaRPr>
-          </a:p>
-        </p:txBody>
-      </p:sp>
-      <p:sp>
-        <p:nvSpPr>
-          <p:cNvPr id="101" name="Rounded Rectangle 100"/>
-          <p:cNvSpPr/>
-          <p:nvPr/>
-        </p:nvSpPr>
-        <p:spPr>
-          <a:xfrm>
-            <a:off x="3548620" y="5648215"/>
-            <a:ext cx="2340000" cy="396000"/>
-          </a:xfrm>
-          <a:prstGeom prst="roundRect">
-            <a:avLst/>
-          </a:prstGeom>
-          <a:solidFill>
-            <a:schemeClr val="bg1"/>
-          </a:solidFill>
-          <a:ln w="12700">
-            <a:solidFill>
-              <a:schemeClr val="tx1">
-                <a:lumMod val="65000"/>
-                <a:lumOff val="35000"/>
-              </a:schemeClr>
-            </a:solidFill>
-          </a:ln>
-          <a:effectLst>
-            <a:outerShdw blurRad="50800" dist="38100" dir="2700000" algn="tl" rotWithShape="0">
-              <a:prstClr val="black">
-                <a:alpha val="40000"/>
-              </a:prstClr>
-            </a:outerShdw>
-          </a:effectLst>
-        </p:spPr>
-        <p:style>
-          <a:lnRef idx="2">
-            <a:schemeClr val="accent1">
-              <a:shade val="50000"/>
-            </a:schemeClr>
-          </a:lnRef>
-          <a:fillRef idx="1">
-            <a:schemeClr val="accent1"/>
-          </a:fillRef>
-          <a:effectRef idx="0">
-            <a:schemeClr val="accent1"/>
-          </a:effectRef>
-          <a:fontRef idx="minor">
-            <a:schemeClr val="lt1"/>
-          </a:fontRef>
-        </p:style>
-        <p:txBody>
-          <a:bodyPr rtlCol="0" anchor="ctr"/>
-          <a:lstStyle/>
-          <a:p>
-            <a:pPr algn="ctr"/>
-            <a:r>
-              <a:rPr lang="en-AU" sz="1100" dirty="0" smtClean="0">
-                <a:solidFill>
-                  <a:schemeClr val="tx1"/>
-                </a:solidFill>
-                <a:latin typeface="Roboto" panose="02000000000000000000" pitchFamily="2" charset="0"/>
-                <a:ea typeface="Roboto" panose="02000000000000000000" pitchFamily="2" charset="0"/>
-                <a:cs typeface="Roboto" panose="02000000000000000000" pitchFamily="2" charset="0"/>
-              </a:rPr>
-              <a:t>Create </a:t>
-            </a:r>
-            <a:r>
-              <a:rPr lang="en-AU" sz="1100" dirty="0" smtClean="0">
-                <a:solidFill>
-                  <a:schemeClr val="tx1"/>
-                </a:solidFill>
-                <a:latin typeface="Roboto" panose="02000000000000000000" pitchFamily="2" charset="0"/>
-                <a:ea typeface="Roboto" panose="02000000000000000000" pitchFamily="2" charset="0"/>
-                <a:cs typeface="Roboto" panose="02000000000000000000" pitchFamily="2" charset="0"/>
-              </a:rPr>
-              <a:t>G1 dealing</a:t>
-            </a:r>
-            <a:endParaRPr lang="en-AU" sz="1100" dirty="0" smtClean="0">
-              <a:solidFill>
-                <a:schemeClr val="tx1"/>
-              </a:solidFill>
-              <a:latin typeface="Roboto" panose="02000000000000000000" pitchFamily="2" charset="0"/>
-              <a:ea typeface="Roboto" panose="02000000000000000000" pitchFamily="2" charset="0"/>
-              <a:cs typeface="Roboto" panose="02000000000000000000" pitchFamily="2" charset="0"/>
-            </a:endParaRPr>
+              <a:t>Create G1 dealing</a:t>
+            </a:r>
           </a:p>
           <a:p>
             <a:pPr algn="ctr"/>
@@ -6034,27 +5996,8 @@
                 <a:ea typeface="Roboto" panose="02000000000000000000" pitchFamily="2" charset="0"/>
                 <a:cs typeface="Roboto" panose="02000000000000000000" pitchFamily="2" charset="0"/>
               </a:rPr>
-              <a:t>Create </a:t>
-            </a:r>
-            <a:r>
-              <a:rPr lang="en-AU" sz="1100" dirty="0" smtClean="0">
-                <a:solidFill>
-                  <a:schemeClr val="tx1"/>
-                </a:solidFill>
-                <a:latin typeface="Roboto" panose="02000000000000000000" pitchFamily="2" charset="0"/>
-                <a:ea typeface="Roboto" panose="02000000000000000000" pitchFamily="2" charset="0"/>
-                <a:cs typeface="Roboto" panose="02000000000000000000" pitchFamily="2" charset="0"/>
-              </a:rPr>
-              <a:t>G1 endorsements</a:t>
-            </a:r>
-            <a:endParaRPr lang="en-AU" sz="1100" dirty="0" smtClean="0">
-              <a:solidFill>
-                <a:schemeClr val="tx1"/>
-              </a:solidFill>
-              <a:latin typeface="Roboto" panose="02000000000000000000" pitchFamily="2" charset="0"/>
-              <a:ea typeface="Roboto" panose="02000000000000000000" pitchFamily="2" charset="0"/>
-              <a:cs typeface="Roboto" panose="02000000000000000000" pitchFamily="2" charset="0"/>
-            </a:endParaRPr>
+              <a:t>Create G1 endorsements</a:t>
+            </a:r>
           </a:p>
         </p:txBody>
       </p:sp>
@@ -12456,7 +12399,7 @@
         </p:nvSpPr>
         <p:spPr>
           <a:xfrm>
-            <a:off x="2545954" y="4507718"/>
+            <a:off x="3012658" y="3877531"/>
             <a:ext cx="1620000" cy="540000"/>
           </a:xfrm>
           <a:prstGeom prst="roundRect">
@@ -12572,117 +12515,13 @@
       </p:sp>
       <p:sp>
         <p:nvSpPr>
-          <p:cNvPr id="44" name="AutoShape 198"/>
-          <p:cNvSpPr>
-            <a:spLocks noChangeArrowheads="1"/>
-          </p:cNvSpPr>
-          <p:nvPr>
-            <p:custDataLst>
-              <p:tags r:id="rId1"/>
-            </p:custDataLst>
-          </p:nvPr>
-        </p:nvSpPr>
-        <p:spPr bwMode="auto">
-          <a:xfrm>
-            <a:off x="1718513" y="3775363"/>
-            <a:ext cx="505800" cy="467950"/>
-          </a:xfrm>
-          <a:prstGeom prst="flowChartDecision">
-            <a:avLst/>
-          </a:prstGeom>
-          <a:solidFill>
-            <a:srgbClr val="FFFFFF"/>
-          </a:solidFill>
-          <a:ln w="9525">
-            <a:solidFill>
-              <a:schemeClr val="tx1"/>
-            </a:solidFill>
-            <a:miter lim="800000"/>
-            <a:headEnd/>
-            <a:tailEnd/>
-          </a:ln>
-          <a:effectLst>
-            <a:outerShdw blurRad="50800" dist="38100" dir="2700000" algn="tl" rotWithShape="0">
-              <a:prstClr val="black">
-                <a:alpha val="40000"/>
-              </a:prstClr>
-            </a:outerShdw>
-          </a:effectLst>
-        </p:spPr>
-        <p:txBody>
-          <a:bodyPr wrap="none" anchor="ctr">
-            <a:prstTxWarp prst="textNoShape">
-              <a:avLst/>
-            </a:prstTxWarp>
-          </a:bodyPr>
-          <a:lstStyle/>
-          <a:p>
-            <a:endParaRPr lang="de-DE"/>
-          </a:p>
-        </p:txBody>
-      </p:sp>
-      <p:sp>
-        <p:nvSpPr>
-          <p:cNvPr id="22" name="TextBox 21"/>
-          <p:cNvSpPr txBox="1"/>
-          <p:nvPr/>
-        </p:nvSpPr>
-        <p:spPr>
-          <a:xfrm>
-            <a:off x="1956439" y="4536901"/>
-            <a:ext cx="725941" cy="441146"/>
-          </a:xfrm>
-          <a:prstGeom prst="rect">
-            <a:avLst/>
-          </a:prstGeom>
-          <a:noFill/>
-        </p:spPr>
-        <p:txBody>
-          <a:bodyPr wrap="square" rtlCol="0">
-            <a:spAutoFit/>
-          </a:bodyPr>
-          <a:lstStyle/>
-          <a:p>
-            <a:pPr>
-              <a:lnSpc>
-                <a:spcPct val="150000"/>
-              </a:lnSpc>
-            </a:pPr>
-            <a:r>
-              <a:rPr lang="en-AU" sz="800" dirty="0" smtClean="0">
-                <a:latin typeface="Roboto" panose="02000000000000000000" pitchFamily="2" charset="0"/>
-                <a:ea typeface="Roboto" panose="02000000000000000000" pitchFamily="2" charset="0"/>
-                <a:cs typeface="Roboto" panose="02000000000000000000" pitchFamily="2" charset="0"/>
-              </a:rPr>
-              <a:t>New </a:t>
-            </a:r>
-          </a:p>
-          <a:p>
-            <a:pPr>
-              <a:lnSpc>
-                <a:spcPct val="150000"/>
-              </a:lnSpc>
-            </a:pPr>
-            <a:r>
-              <a:rPr lang="en-AU" sz="800" dirty="0" smtClean="0">
-                <a:latin typeface="Roboto" panose="02000000000000000000" pitchFamily="2" charset="0"/>
-                <a:ea typeface="Roboto" panose="02000000000000000000" pitchFamily="2" charset="0"/>
-                <a:cs typeface="Roboto" panose="02000000000000000000" pitchFamily="2" charset="0"/>
-              </a:rPr>
-              <a:t>parcel</a:t>
-            </a:r>
-          </a:p>
-        </p:txBody>
-      </p:sp>
-      <p:sp>
-        <p:nvSpPr>
           <p:cNvPr id="45" name="Rounded Rectangle 44"/>
           <p:cNvSpPr/>
           <p:nvPr/>
         </p:nvSpPr>
         <p:spPr>
           <a:xfrm>
-            <a:off x="4356472" y="4507716"/>
+            <a:off x="4823176" y="3877529"/>
             <a:ext cx="1620000" cy="540000"/>
           </a:xfrm>
           <a:prstGeom prst="roundRect">
@@ -12761,7 +12600,7 @@
         </p:nvCxnSpPr>
         <p:spPr>
           <a:xfrm flipV="1">
-            <a:off x="4165954" y="4777716"/>
+            <a:off x="4632658" y="4147529"/>
             <a:ext cx="190518" cy="2"/>
           </a:xfrm>
           <a:prstGeom prst="straightConnector1">
@@ -12794,14 +12633,15 @@
         <p:nvCxnSpPr>
           <p:cNvPr id="49" name="Elbow Connector 48"/>
           <p:cNvCxnSpPr>
+            <a:stCxn id="5" idx="2"/>
             <a:endCxn id="34" idx="1"/>
           </p:cNvCxnSpPr>
           <p:nvPr/>
         </p:nvCxnSpPr>
         <p:spPr>
           <a:xfrm rot="16200000" flipH="1">
-            <a:off x="519652" y="2849353"/>
-            <a:ext cx="891067" cy="218192"/>
+            <a:off x="1042553" y="2880580"/>
+            <a:ext cx="893934" cy="125831"/>
           </a:xfrm>
           <a:prstGeom prst="bentConnector2">
             <a:avLst/>
@@ -12828,52 +12668,15 @@
           </a:fontRef>
         </p:style>
       </p:cxnSp>
-      <p:cxnSp>
-        <p:nvCxnSpPr>
-          <p:cNvPr id="60" name="Elbow Connector 59"/>
-          <p:cNvCxnSpPr>
-            <a:stCxn id="44" idx="2"/>
-            <a:endCxn id="8" idx="1"/>
-          </p:cNvCxnSpPr>
-          <p:nvPr/>
-        </p:nvCxnSpPr>
-        <p:spPr>
-          <a:xfrm rot="16200000" flipH="1">
-            <a:off x="1991481" y="4223244"/>
-            <a:ext cx="534405" cy="574541"/>
-          </a:xfrm>
-          <a:prstGeom prst="bentConnector2">
-            <a:avLst/>
-          </a:prstGeom>
-          <a:ln w="28575">
-            <a:headEnd type="none" w="med" len="med"/>
-            <a:tailEnd type="triangle" w="lg" len="med"/>
-          </a:ln>
-        </p:spPr>
-        <p:style>
-          <a:lnRef idx="1">
-            <a:schemeClr val="accent1"/>
-          </a:lnRef>
-          <a:fillRef idx="0">
-            <a:schemeClr val="accent1"/>
-          </a:fillRef>
-          <a:effectRef idx="0">
-            <a:schemeClr val="accent1"/>
-          </a:effectRef>
-          <a:fontRef idx="minor">
-            <a:schemeClr val="tx1"/>
-          </a:fontRef>
-        </p:style>
-      </p:cxnSp>
-      <p:sp>
-        <p:nvSpPr>
-          <p:cNvPr id="61" name="Rounded Rectangle 60"/>
+      <p:sp>
+        <p:nvSpPr>
+          <p:cNvPr id="66" name="Rounded Rectangle 65"/>
           <p:cNvSpPr/>
           <p:nvPr/>
         </p:nvSpPr>
         <p:spPr>
           <a:xfrm>
-            <a:off x="4344180" y="3739338"/>
+            <a:off x="4864555" y="2499395"/>
             <a:ext cx="1620000" cy="540000"/>
           </a:xfrm>
           <a:prstGeom prst="roundRect">
@@ -12941,19 +12744,100 @@
           </a:p>
         </p:txBody>
       </p:sp>
+      <p:sp>
+        <p:nvSpPr>
+          <p:cNvPr id="79" name="TextBox 78"/>
+          <p:cNvSpPr txBox="1"/>
+          <p:nvPr/>
+        </p:nvSpPr>
+        <p:spPr>
+          <a:xfrm>
+            <a:off x="2847484" y="2532530"/>
+            <a:ext cx="975174" cy="256480"/>
+          </a:xfrm>
+          <a:prstGeom prst="rect">
+            <a:avLst/>
+          </a:prstGeom>
+          <a:noFill/>
+        </p:spPr>
+        <p:txBody>
+          <a:bodyPr wrap="square" rtlCol="0">
+            <a:spAutoFit/>
+          </a:bodyPr>
+          <a:lstStyle/>
+          <a:p>
+            <a:pPr>
+              <a:lnSpc>
+                <a:spcPct val="150000"/>
+              </a:lnSpc>
+            </a:pPr>
+            <a:r>
+              <a:rPr lang="en-AU" sz="800" dirty="0" smtClean="0">
+                <a:latin typeface="Roboto" panose="02000000000000000000" pitchFamily="2" charset="0"/>
+                <a:ea typeface="Roboto" panose="02000000000000000000" pitchFamily="2" charset="0"/>
+                <a:cs typeface="Roboto" panose="02000000000000000000" pitchFamily="2" charset="0"/>
+              </a:rPr>
+              <a:t>Existing parcel</a:t>
+            </a:r>
+          </a:p>
+        </p:txBody>
+      </p:sp>
+      <p:sp>
+        <p:nvSpPr>
+          <p:cNvPr id="81" name="Oval 230"/>
+          <p:cNvSpPr>
+            <a:spLocks noChangeArrowheads="1"/>
+          </p:cNvSpPr>
+          <p:nvPr>
+            <p:custDataLst>
+              <p:tags r:id="rId1"/>
+            </p:custDataLst>
+          </p:nvPr>
+        </p:nvSpPr>
+        <p:spPr bwMode="auto">
+          <a:xfrm>
+            <a:off x="8634654" y="2658267"/>
+            <a:ext cx="262639" cy="259783"/>
+          </a:xfrm>
+          <a:prstGeom prst="ellipse">
+            <a:avLst/>
+          </a:prstGeom>
+          <a:solidFill>
+            <a:srgbClr val="FFFFFF"/>
+          </a:solidFill>
+          <a:ln w="38100" cap="flat" cmpd="sng" algn="ctr">
+            <a:solidFill>
+              <a:schemeClr val="tx1"/>
+            </a:solidFill>
+            <a:prstDash val="solid"/>
+            <a:round/>
+            <a:headEnd type="none" w="med" len="med"/>
+            <a:tailEnd type="none" w="med" len="med"/>
+          </a:ln>
+          <a:effectLst/>
+        </p:spPr>
+        <p:txBody>
+          <a:bodyPr wrap="none" anchor="ctr">
+            <a:prstTxWarp prst="textNoShape">
+              <a:avLst/>
+            </a:prstTxWarp>
+          </a:bodyPr>
+          <a:lstStyle/>
+          <a:p>
+            <a:endParaRPr lang="de-DE"/>
+          </a:p>
+        </p:txBody>
+      </p:sp>
       <p:cxnSp>
         <p:nvCxnSpPr>
-          <p:cNvPr id="62" name="Straight Arrow Connector 61"/>
-          <p:cNvCxnSpPr>
-            <a:stCxn id="44" idx="3"/>
-            <a:endCxn id="61" idx="1"/>
-          </p:cNvCxnSpPr>
+          <p:cNvPr id="82" name="Straight Arrow Connector 81"/>
+          <p:cNvCxnSpPr/>
           <p:nvPr/>
         </p:nvCxnSpPr>
         <p:spPr>
-          <a:xfrm>
-            <a:off x="2224313" y="4009338"/>
-            <a:ext cx="2119867" cy="0"/>
+          <a:xfrm flipV="1">
+            <a:off x="8370814" y="2788161"/>
+            <a:ext cx="243860" cy="1"/>
           </a:xfrm>
           <a:prstGeom prst="straightConnector1">
             <a:avLst/>
@@ -12983,248 +12867,13 @@
       </p:cxnSp>
       <p:sp>
         <p:nvSpPr>
-          <p:cNvPr id="66" name="Rounded Rectangle 65"/>
-          <p:cNvSpPr/>
-          <p:nvPr/>
-        </p:nvSpPr>
-        <p:spPr>
-          <a:xfrm>
-            <a:off x="4386400" y="2512915"/>
-            <a:ext cx="1620000" cy="540000"/>
-          </a:xfrm>
-          <a:prstGeom prst="roundRect">
-            <a:avLst/>
-          </a:prstGeom>
-          <a:solidFill>
-            <a:schemeClr val="bg1"/>
-          </a:solidFill>
-          <a:ln w="12700">
-            <a:solidFill>
-              <a:schemeClr val="tx1">
-                <a:lumMod val="65000"/>
-                <a:lumOff val="35000"/>
-              </a:schemeClr>
-            </a:solidFill>
-          </a:ln>
-          <a:effectLst>
-            <a:outerShdw blurRad="50800" dist="38100" dir="2700000" algn="tl" rotWithShape="0">
-              <a:prstClr val="black">
-                <a:alpha val="40000"/>
-              </a:prstClr>
-            </a:outerShdw>
-          </a:effectLst>
-        </p:spPr>
-        <p:style>
-          <a:lnRef idx="2">
-            <a:schemeClr val="accent1">
-              <a:shade val="50000"/>
-            </a:schemeClr>
-          </a:lnRef>
-          <a:fillRef idx="1">
-            <a:schemeClr val="accent1"/>
-          </a:fillRef>
-          <a:effectRef idx="0">
-            <a:schemeClr val="accent1"/>
-          </a:effectRef>
-          <a:fontRef idx="minor">
-            <a:schemeClr val="lt1"/>
-          </a:fontRef>
-        </p:style>
-        <p:txBody>
-          <a:bodyPr rtlCol="0" anchor="ctr"/>
-          <a:lstStyle/>
-          <a:p>
-            <a:pPr algn="ctr"/>
-            <a:r>
-              <a:rPr lang="en-AU" sz="1400" dirty="0" smtClean="0">
-                <a:solidFill>
-                  <a:schemeClr val="tx1"/>
-                </a:solidFill>
-                <a:latin typeface="Roboto" panose="02000000000000000000" pitchFamily="2" charset="0"/>
-                <a:ea typeface="Roboto" panose="02000000000000000000" pitchFamily="2" charset="0"/>
-                <a:cs typeface="Roboto" panose="02000000000000000000" pitchFamily="2" charset="0"/>
-              </a:rPr>
-              <a:t>Create cancelled folio</a:t>
-            </a:r>
-            <a:endParaRPr lang="en-AU" sz="1400" dirty="0">
-              <a:solidFill>
-                <a:schemeClr val="tx1"/>
-              </a:solidFill>
-              <a:latin typeface="Roboto" panose="02000000000000000000" pitchFamily="2" charset="0"/>
-              <a:ea typeface="Roboto" panose="02000000000000000000" pitchFamily="2" charset="0"/>
-              <a:cs typeface="Roboto" panose="02000000000000000000" pitchFamily="2" charset="0"/>
-            </a:endParaRPr>
-          </a:p>
-        </p:txBody>
-      </p:sp>
-      <p:sp>
-        <p:nvSpPr>
-          <p:cNvPr id="74" name="TextBox 73"/>
-          <p:cNvSpPr txBox="1"/>
-          <p:nvPr/>
-        </p:nvSpPr>
-        <p:spPr>
-          <a:xfrm>
-            <a:off x="2157980" y="3778506"/>
-            <a:ext cx="975174" cy="276999"/>
-          </a:xfrm>
-          <a:prstGeom prst="rect">
-            <a:avLst/>
-          </a:prstGeom>
-          <a:noFill/>
-        </p:spPr>
-        <p:txBody>
-          <a:bodyPr wrap="square" rtlCol="0">
-            <a:spAutoFit/>
-          </a:bodyPr>
-          <a:lstStyle/>
-          <a:p>
-            <a:pPr>
-              <a:lnSpc>
-                <a:spcPct val="150000"/>
-              </a:lnSpc>
-            </a:pPr>
-            <a:r>
-              <a:rPr lang="en-AU" sz="800" dirty="0" smtClean="0">
-                <a:latin typeface="Roboto" panose="02000000000000000000" pitchFamily="2" charset="0"/>
-                <a:ea typeface="Roboto" panose="02000000000000000000" pitchFamily="2" charset="0"/>
-                <a:cs typeface="Roboto" panose="02000000000000000000" pitchFamily="2" charset="0"/>
-              </a:rPr>
-              <a:t>Existing parcel</a:t>
-            </a:r>
-          </a:p>
-        </p:txBody>
-      </p:sp>
-      <p:sp>
-        <p:nvSpPr>
-          <p:cNvPr id="79" name="TextBox 78"/>
-          <p:cNvSpPr txBox="1"/>
-          <p:nvPr/>
-        </p:nvSpPr>
-        <p:spPr>
-          <a:xfrm>
-            <a:off x="2369329" y="2546050"/>
-            <a:ext cx="975174" cy="256480"/>
-          </a:xfrm>
-          <a:prstGeom prst="rect">
-            <a:avLst/>
-          </a:prstGeom>
-          <a:noFill/>
-        </p:spPr>
-        <p:txBody>
-          <a:bodyPr wrap="square" rtlCol="0">
-            <a:spAutoFit/>
-          </a:bodyPr>
-          <a:lstStyle/>
-          <a:p>
-            <a:pPr>
-              <a:lnSpc>
-                <a:spcPct val="150000"/>
-              </a:lnSpc>
-            </a:pPr>
-            <a:r>
-              <a:rPr lang="en-AU" sz="800" dirty="0" smtClean="0">
-                <a:latin typeface="Roboto" panose="02000000000000000000" pitchFamily="2" charset="0"/>
-                <a:ea typeface="Roboto" panose="02000000000000000000" pitchFamily="2" charset="0"/>
-                <a:cs typeface="Roboto" panose="02000000000000000000" pitchFamily="2" charset="0"/>
-              </a:rPr>
-              <a:t>Existing parcel</a:t>
-            </a:r>
-          </a:p>
-        </p:txBody>
-      </p:sp>
-      <p:sp>
-        <p:nvSpPr>
-          <p:cNvPr id="81" name="Oval 230"/>
-          <p:cNvSpPr>
-            <a:spLocks noChangeArrowheads="1"/>
-          </p:cNvSpPr>
-          <p:nvPr>
-            <p:custDataLst>
-              <p:tags r:id="rId2"/>
-            </p:custDataLst>
-          </p:nvPr>
-        </p:nvSpPr>
-        <p:spPr bwMode="auto">
-          <a:xfrm>
-            <a:off x="8156499" y="2671787"/>
-            <a:ext cx="262639" cy="259783"/>
-          </a:xfrm>
-          <a:prstGeom prst="ellipse">
-            <a:avLst/>
-          </a:prstGeom>
-          <a:solidFill>
-            <a:srgbClr val="FFFFFF"/>
-          </a:solidFill>
-          <a:ln w="38100" cap="flat" cmpd="sng" algn="ctr">
-            <a:solidFill>
-              <a:schemeClr val="tx1"/>
-            </a:solidFill>
-            <a:prstDash val="solid"/>
-            <a:round/>
-            <a:headEnd type="none" w="med" len="med"/>
-            <a:tailEnd type="none" w="med" len="med"/>
-          </a:ln>
-          <a:effectLst/>
-        </p:spPr>
-        <p:txBody>
-          <a:bodyPr wrap="none" anchor="ctr">
-            <a:prstTxWarp prst="textNoShape">
-              <a:avLst/>
-            </a:prstTxWarp>
-          </a:bodyPr>
-          <a:lstStyle/>
-          <a:p>
-            <a:endParaRPr lang="de-DE"/>
-          </a:p>
-        </p:txBody>
-      </p:sp>
-      <p:cxnSp>
-        <p:nvCxnSpPr>
-          <p:cNvPr id="82" name="Straight Arrow Connector 81"/>
-          <p:cNvCxnSpPr/>
-          <p:nvPr/>
-        </p:nvCxnSpPr>
-        <p:spPr>
-          <a:xfrm flipV="1">
-            <a:off x="7892659" y="2801681"/>
-            <a:ext cx="243860" cy="1"/>
-          </a:xfrm>
-          <a:prstGeom prst="straightConnector1">
-            <a:avLst/>
-          </a:prstGeom>
-          <a:ln w="28575">
-            <a:solidFill>
-              <a:schemeClr val="accent1"/>
-            </a:solidFill>
-            <a:headEnd type="none" w="med" len="med"/>
-            <a:tailEnd type="triangle" w="lg" len="med"/>
-          </a:ln>
-        </p:spPr>
-        <p:style>
-          <a:lnRef idx="1">
-            <a:schemeClr val="accent1"/>
-          </a:lnRef>
-          <a:fillRef idx="0">
-            <a:schemeClr val="accent1"/>
-          </a:fillRef>
-          <a:effectRef idx="0">
-            <a:schemeClr val="accent1"/>
-          </a:effectRef>
-          <a:fontRef idx="minor">
-            <a:schemeClr val="tx1"/>
-          </a:fontRef>
-        </p:style>
-      </p:cxnSp>
-      <p:sp>
-        <p:nvSpPr>
           <p:cNvPr id="83" name="Rounded Rectangle 82"/>
           <p:cNvSpPr/>
           <p:nvPr/>
         </p:nvSpPr>
         <p:spPr>
           <a:xfrm>
-            <a:off x="6159777" y="4507717"/>
+            <a:off x="6626481" y="3877530"/>
             <a:ext cx="1620000" cy="540000"/>
           </a:xfrm>
           <a:prstGeom prst="roundRect">
@@ -13294,25 +12943,26 @@
       </p:sp>
       <p:cxnSp>
         <p:nvCxnSpPr>
-          <p:cNvPr id="89" name="Elbow Connector 88"/>
+          <p:cNvPr id="94" name="Straight Arrow Connector 93"/>
           <p:cNvCxnSpPr>
-            <a:stCxn id="61" idx="3"/>
-            <a:endCxn id="83" idx="0"/>
+            <a:stCxn id="45" idx="3"/>
+            <a:endCxn id="83" idx="1"/>
           </p:cNvCxnSpPr>
           <p:nvPr/>
         </p:nvCxnSpPr>
         <p:spPr>
           <a:xfrm>
-            <a:off x="5964180" y="4009338"/>
-            <a:ext cx="1005597" cy="498379"/>
-          </a:xfrm>
-          <a:prstGeom prst="bentConnector2">
+            <a:off x="6443176" y="4147529"/>
+            <a:ext cx="183305" cy="1"/>
+          </a:xfrm>
+          <a:prstGeom prst="straightConnector1">
             <a:avLst/>
           </a:prstGeom>
           <a:ln w="28575">
             <a:solidFill>
               <a:schemeClr val="accent1"/>
             </a:solidFill>
+            <a:headEnd type="none" w="med" len="med"/>
             <a:tailEnd type="triangle" w="lg" len="med"/>
           </a:ln>
         </p:spPr>
@@ -13331,46 +12981,6 @@
           </a:fontRef>
         </p:style>
       </p:cxnSp>
-      <p:cxnSp>
-        <p:nvCxnSpPr>
-          <p:cNvPr id="94" name="Straight Arrow Connector 93"/>
-          <p:cNvCxnSpPr>
-            <a:stCxn id="45" idx="3"/>
-            <a:endCxn id="83" idx="1"/>
-          </p:cNvCxnSpPr>
-          <p:nvPr/>
-        </p:nvCxnSpPr>
-        <p:spPr>
-          <a:xfrm>
-            <a:off x="5976472" y="4777716"/>
-            <a:ext cx="183305" cy="1"/>
-          </a:xfrm>
-          <a:prstGeom prst="straightConnector1">
-            <a:avLst/>
-          </a:prstGeom>
-          <a:ln w="28575">
-            <a:solidFill>
-              <a:schemeClr val="accent1"/>
-            </a:solidFill>
-            <a:headEnd type="none" w="med" len="med"/>
-            <a:tailEnd type="triangle" w="lg" len="med"/>
-          </a:ln>
-        </p:spPr>
-        <p:style>
-          <a:lnRef idx="1">
-            <a:schemeClr val="accent1"/>
-          </a:lnRef>
-          <a:fillRef idx="0">
-            <a:schemeClr val="accent1"/>
-          </a:fillRef>
-          <a:effectRef idx="0">
-            <a:schemeClr val="accent1"/>
-          </a:effectRef>
-          <a:fontRef idx="minor">
-            <a:schemeClr val="tx1"/>
-          </a:fontRef>
-        </p:style>
-      </p:cxnSp>
       <p:sp>
         <p:nvSpPr>
           <p:cNvPr id="103" name="Rounded Rectangle 102"/>
@@ -13379,7 +12989,7 @@
         </p:nvSpPr>
         <p:spPr>
           <a:xfrm>
-            <a:off x="6791094" y="6002808"/>
+            <a:off x="7257798" y="5372621"/>
             <a:ext cx="1620000" cy="540000"/>
           </a:xfrm>
           <a:prstGeom prst="roundRect">
@@ -13455,7 +13065,7 @@
         </p:nvSpPr>
         <p:spPr>
           <a:xfrm>
-            <a:off x="6530871" y="5243079"/>
+            <a:off x="6997575" y="4612892"/>
             <a:ext cx="1620000" cy="540000"/>
           </a:xfrm>
           <a:prstGeom prst="roundRect">
@@ -13531,13 +13141,13 @@
           </p:cNvSpPr>
           <p:nvPr>
             <p:custDataLst>
-              <p:tags r:id="rId3"/>
+              <p:tags r:id="rId2"/>
             </p:custDataLst>
           </p:nvPr>
         </p:nvSpPr>
         <p:spPr bwMode="auto">
           <a:xfrm>
-            <a:off x="8627325" y="6232916"/>
+            <a:off x="7936478" y="6133072"/>
             <a:ext cx="262639" cy="259783"/>
           </a:xfrm>
           <a:prstGeom prst="ellipse">
@@ -13573,14 +13183,15 @@
         <p:nvCxnSpPr>
           <p:cNvPr id="106" name="Straight Arrow Connector 105"/>
           <p:cNvCxnSpPr>
-            <a:endCxn id="105" idx="2"/>
+            <a:stCxn id="103" idx="2"/>
+            <a:endCxn id="105" idx="0"/>
           </p:cNvCxnSpPr>
           <p:nvPr/>
         </p:nvCxnSpPr>
         <p:spPr>
           <a:xfrm>
-            <a:off x="8411093" y="6362808"/>
-            <a:ext cx="216232" cy="0"/>
+            <a:off x="8067798" y="5912621"/>
+            <a:ext cx="0" cy="220451"/>
           </a:xfrm>
           <a:prstGeom prst="straightConnector1">
             <a:avLst/>
@@ -13616,7 +13227,7 @@
         </p:nvCxnSpPr>
         <p:spPr>
           <a:xfrm>
-            <a:off x="6951857" y="5035864"/>
+            <a:off x="7418561" y="4405677"/>
             <a:ext cx="0" cy="199865"/>
           </a:xfrm>
           <a:prstGeom prst="straightConnector1">
@@ -13653,7 +13264,7 @@
         </p:nvCxnSpPr>
         <p:spPr>
           <a:xfrm>
-            <a:off x="7340494" y="5783079"/>
+            <a:off x="7807198" y="5152892"/>
             <a:ext cx="0" cy="219730"/>
           </a:xfrm>
           <a:prstGeom prst="straightConnector1">
@@ -13685,6 +13296,92 @@
       <p:sp>
         <p:nvSpPr>
           <p:cNvPr id="29" name="Oval 230"/>
+          <p:cNvSpPr>
+            <a:spLocks noChangeArrowheads="1"/>
+          </p:cNvSpPr>
+          <p:nvPr>
+            <p:custDataLst>
+              <p:tags r:id="rId3"/>
+            </p:custDataLst>
+          </p:nvPr>
+        </p:nvSpPr>
+        <p:spPr bwMode="auto">
+          <a:xfrm>
+            <a:off x="166399" y="1321553"/>
+            <a:ext cx="262639" cy="259783"/>
+          </a:xfrm>
+          <a:prstGeom prst="ellipse">
+            <a:avLst/>
+          </a:prstGeom>
+          <a:solidFill>
+            <a:srgbClr val="FFFFFF"/>
+          </a:solidFill>
+          <a:ln w="38100" cap="flat" cmpd="sng" algn="ctr">
+            <a:solidFill>
+              <a:srgbClr val="008000"/>
+            </a:solidFill>
+            <a:prstDash val="solid"/>
+            <a:round/>
+            <a:headEnd type="none" w="med" len="med"/>
+            <a:tailEnd type="none" w="med" len="med"/>
+          </a:ln>
+          <a:effectLst/>
+        </p:spPr>
+        <p:txBody>
+          <a:bodyPr wrap="none" anchor="ctr">
+            <a:prstTxWarp prst="textNoShape">
+              <a:avLst/>
+            </a:prstTxWarp>
+          </a:bodyPr>
+          <a:lstStyle/>
+          <a:p>
+            <a:endParaRPr lang="de-DE"/>
+          </a:p>
+        </p:txBody>
+      </p:sp>
+      <p:cxnSp>
+        <p:nvCxnSpPr>
+          <p:cNvPr id="30" name="Straight Arrow Connector 29"/>
+          <p:cNvCxnSpPr>
+            <a:stCxn id="29" idx="6"/>
+            <a:endCxn id="64" idx="1"/>
+          </p:cNvCxnSpPr>
+          <p:nvPr/>
+        </p:nvCxnSpPr>
+        <p:spPr>
+          <a:xfrm>
+            <a:off x="429038" y="1451445"/>
+            <a:ext cx="187567" cy="0"/>
+          </a:xfrm>
+          <a:prstGeom prst="straightConnector1">
+            <a:avLst/>
+          </a:prstGeom>
+          <a:ln w="28575">
+            <a:solidFill>
+              <a:schemeClr val="accent1"/>
+            </a:solidFill>
+            <a:headEnd type="none" w="med" len="med"/>
+            <a:tailEnd type="triangle" w="lg" len="med"/>
+          </a:ln>
+        </p:spPr>
+        <p:style>
+          <a:lnRef idx="1">
+            <a:schemeClr val="accent1"/>
+          </a:lnRef>
+          <a:fillRef idx="0">
+            <a:schemeClr val="accent1"/>
+          </a:fillRef>
+          <a:effectRef idx="0">
+            <a:schemeClr val="accent1"/>
+          </a:effectRef>
+          <a:fontRef idx="minor">
+            <a:schemeClr val="tx1"/>
+          </a:fontRef>
+        </p:style>
+      </p:cxnSp>
+      <p:sp>
+        <p:nvSpPr>
+          <p:cNvPr id="31" name="AutoShape 198"/>
           <p:cNvSpPr>
             <a:spLocks noChangeArrowheads="1"/>
           </p:cNvSpPr>
@@ -13696,25 +13393,30 @@
         </p:nvSpPr>
         <p:spPr bwMode="auto">
           <a:xfrm>
-            <a:off x="166399" y="1321553"/>
-            <a:ext cx="262639" cy="259783"/>
-          </a:xfrm>
-          <a:prstGeom prst="ellipse">
+            <a:off x="2335599" y="2532530"/>
+            <a:ext cx="505800" cy="467950"/>
+          </a:xfrm>
+          <a:prstGeom prst="flowChartDecision">
             <a:avLst/>
           </a:prstGeom>
           <a:solidFill>
             <a:srgbClr val="FFFFFF"/>
           </a:solidFill>
-          <a:ln w="38100" cap="flat" cmpd="sng" algn="ctr">
-            <a:solidFill>
-              <a:srgbClr val="008000"/>
-            </a:solidFill>
-            <a:prstDash val="solid"/>
-            <a:round/>
-            <a:headEnd type="none" w="med" len="med"/>
-            <a:tailEnd type="none" w="med" len="med"/>
-          </a:ln>
-          <a:effectLst/>
+          <a:ln w="9525">
+            <a:solidFill>
+              <a:schemeClr val="tx1"/>
+            </a:solidFill>
+            <a:miter lim="800000"/>
+            <a:headEnd/>
+            <a:tailEnd/>
+          </a:ln>
+          <a:effectLst>
+            <a:outerShdw blurRad="50800" dist="38100" dir="2700000" algn="tl" rotWithShape="0">
+              <a:prstClr val="black">
+                <a:alpha val="40000"/>
+              </a:prstClr>
+            </a:outerShdw>
+          </a:effectLst>
         </p:spPr>
         <p:txBody>
           <a:bodyPr wrap="none" anchor="ctr">
@@ -13728,49 +13430,9 @@
           </a:p>
         </p:txBody>
       </p:sp>
-      <p:cxnSp>
-        <p:nvCxnSpPr>
-          <p:cNvPr id="30" name="Straight Arrow Connector 29"/>
-          <p:cNvCxnSpPr>
-            <a:stCxn id="29" idx="6"/>
-            <a:endCxn id="64" idx="1"/>
-          </p:cNvCxnSpPr>
-          <p:nvPr/>
-        </p:nvCxnSpPr>
-        <p:spPr>
-          <a:xfrm>
-            <a:off x="429038" y="1451445"/>
-            <a:ext cx="187567" cy="0"/>
-          </a:xfrm>
-          <a:prstGeom prst="straightConnector1">
-            <a:avLst/>
-          </a:prstGeom>
-          <a:ln w="28575">
-            <a:solidFill>
-              <a:schemeClr val="accent1"/>
-            </a:solidFill>
-            <a:headEnd type="none" w="med" len="med"/>
-            <a:tailEnd type="triangle" w="lg" len="med"/>
-          </a:ln>
-        </p:spPr>
-        <p:style>
-          <a:lnRef idx="1">
-            <a:schemeClr val="accent1"/>
-          </a:lnRef>
-          <a:fillRef idx="0">
-            <a:schemeClr val="accent1"/>
-          </a:fillRef>
-          <a:effectRef idx="0">
-            <a:schemeClr val="accent1"/>
-          </a:effectRef>
-          <a:fontRef idx="minor">
-            <a:schemeClr val="tx1"/>
-          </a:fontRef>
-        </p:style>
-      </p:cxnSp>
-      <p:sp>
-        <p:nvSpPr>
-          <p:cNvPr id="31" name="AutoShape 198"/>
+      <p:sp>
+        <p:nvSpPr>
+          <p:cNvPr id="34" name="AutoShape 198"/>
           <p:cNvSpPr>
             <a:spLocks noChangeArrowheads="1"/>
           </p:cNvSpPr>
@@ -13782,7 +13444,7 @@
         </p:nvSpPr>
         <p:spPr bwMode="auto">
           <a:xfrm>
-            <a:off x="1857444" y="2546050"/>
+            <a:off x="1552436" y="3156488"/>
             <a:ext cx="505800" cy="467950"/>
           </a:xfrm>
           <a:prstGeom prst="flowChartDecision">
@@ -13819,57 +13481,6 @@
           </a:p>
         </p:txBody>
       </p:sp>
-      <p:sp>
-        <p:nvSpPr>
-          <p:cNvPr id="34" name="AutoShape 198"/>
-          <p:cNvSpPr>
-            <a:spLocks noChangeArrowheads="1"/>
-          </p:cNvSpPr>
-          <p:nvPr>
-            <p:custDataLst>
-              <p:tags r:id="rId6"/>
-            </p:custDataLst>
-          </p:nvPr>
-        </p:nvSpPr>
-        <p:spPr bwMode="auto">
-          <a:xfrm>
-            <a:off x="1074281" y="3170008"/>
-            <a:ext cx="505800" cy="467950"/>
-          </a:xfrm>
-          <a:prstGeom prst="flowChartDecision">
-            <a:avLst/>
-          </a:prstGeom>
-          <a:solidFill>
-            <a:srgbClr val="FFFFFF"/>
-          </a:solidFill>
-          <a:ln w="9525">
-            <a:solidFill>
-              <a:schemeClr val="tx1"/>
-            </a:solidFill>
-            <a:miter lim="800000"/>
-            <a:headEnd/>
-            <a:tailEnd/>
-          </a:ln>
-          <a:effectLst>
-            <a:outerShdw blurRad="50800" dist="38100" dir="2700000" algn="tl" rotWithShape="0">
-              <a:prstClr val="black">
-                <a:alpha val="40000"/>
-              </a:prstClr>
-            </a:outerShdw>
-          </a:effectLst>
-        </p:spPr>
-        <p:txBody>
-          <a:bodyPr wrap="none" anchor="ctr">
-            <a:prstTxWarp prst="textNoShape">
-              <a:avLst/>
-            </a:prstTxWarp>
-          </a:bodyPr>
-          <a:lstStyle/>
-          <a:p>
-            <a:endParaRPr lang="de-DE"/>
-          </a:p>
-        </p:txBody>
-      </p:sp>
       <p:cxnSp>
         <p:nvCxnSpPr>
           <p:cNvPr id="41" name="Elbow Connector 40"/>
@@ -13881,7 +13492,7 @@
         </p:nvCxnSpPr>
         <p:spPr>
           <a:xfrm rot="5400000" flipH="1" flipV="1">
-            <a:off x="1397321" y="2709886"/>
+            <a:off x="1875476" y="2696366"/>
             <a:ext cx="389983" cy="530263"/>
           </a:xfrm>
           <a:prstGeom prst="bentConnector2">
@@ -13914,14 +13525,14 @@
           <p:cNvPr id="47" name="Elbow Connector 46"/>
           <p:cNvCxnSpPr>
             <a:stCxn id="34" idx="2"/>
-            <a:endCxn id="44" idx="1"/>
+            <a:endCxn id="8" idx="1"/>
           </p:cNvCxnSpPr>
           <p:nvPr/>
         </p:nvCxnSpPr>
         <p:spPr>
           <a:xfrm rot="16200000" flipH="1">
-            <a:off x="1337157" y="3627982"/>
-            <a:ext cx="371380" cy="391332"/>
+            <a:off x="2147451" y="3282323"/>
+            <a:ext cx="523093" cy="1207322"/>
           </a:xfrm>
           <a:prstGeom prst="bentConnector2">
             <a:avLst/>
@@ -13956,7 +13567,7 @@
         </p:nvSpPr>
         <p:spPr>
           <a:xfrm>
-            <a:off x="1344236" y="2718537"/>
+            <a:off x="1822391" y="2705017"/>
             <a:ext cx="975174" cy="256480"/>
           </a:xfrm>
           <a:prstGeom prst="rect">
@@ -13994,7 +13605,7 @@
         </p:nvSpPr>
         <p:spPr>
           <a:xfrm>
-            <a:off x="1285202" y="3762811"/>
+            <a:off x="1763357" y="3749291"/>
             <a:ext cx="975174" cy="256480"/>
           </a:xfrm>
           <a:prstGeom prst="rect">
@@ -14035,7 +13646,7 @@
         </p:nvCxnSpPr>
         <p:spPr>
           <a:xfrm>
-            <a:off x="2363244" y="2780025"/>
+            <a:off x="2841399" y="2766505"/>
             <a:ext cx="2023156" cy="2890"/>
           </a:xfrm>
           <a:prstGeom prst="bentConnector3">
@@ -14073,7 +13684,7 @@
         </p:nvSpPr>
         <p:spPr>
           <a:xfrm>
-            <a:off x="2560424" y="3014000"/>
+            <a:off x="3038579" y="3000480"/>
             <a:ext cx="1620000" cy="540000"/>
           </a:xfrm>
           <a:prstGeom prst="roundRect">
@@ -14151,7 +13762,7 @@
         </p:nvCxnSpPr>
         <p:spPr>
           <a:xfrm>
-            <a:off x="2110344" y="2984425"/>
+            <a:off x="2588499" y="2970905"/>
             <a:ext cx="450080" cy="299575"/>
           </a:xfrm>
           <a:prstGeom prst="bentConnector3">
@@ -14192,7 +13803,7 @@
         </p:nvCxnSpPr>
         <p:spPr>
           <a:xfrm flipV="1">
-            <a:off x="4180424" y="3052915"/>
+            <a:off x="4658579" y="3039395"/>
             <a:ext cx="1015976" cy="231085"/>
           </a:xfrm>
           <a:prstGeom prst="bentConnector2">
@@ -14228,7 +13839,7 @@
         </p:nvSpPr>
         <p:spPr>
           <a:xfrm>
-            <a:off x="2091465" y="3043173"/>
+            <a:off x="2569620" y="3029653"/>
             <a:ext cx="725941" cy="441146"/>
           </a:xfrm>
           <a:prstGeom prst="rect">
@@ -14281,7 +13892,7 @@
         </p:nvSpPr>
         <p:spPr>
           <a:xfrm>
-            <a:off x="6274029" y="2532530"/>
+            <a:off x="6752184" y="2519010"/>
             <a:ext cx="1620000" cy="540000"/>
           </a:xfrm>
           <a:prstGeom prst="roundRect">
@@ -14357,7 +13968,7 @@
         </p:nvCxnSpPr>
         <p:spPr>
           <a:xfrm flipV="1">
-            <a:off x="6025555" y="2780026"/>
+            <a:off x="6503710" y="2766506"/>
             <a:ext cx="243860" cy="1"/>
           </a:xfrm>
           <a:prstGeom prst="straightConnector1">
@@ -17172,7 +16783,7 @@
 
 <file path=ppt/tags/tag19.xml><?xml version="1.0" encoding="utf-8"?>
 <p:tagLst xmlns:a="http://schemas.openxmlformats.org/drawingml/2006/main" xmlns:r="http://schemas.openxmlformats.org/officeDocument/2006/relationships" xmlns:p="http://schemas.openxmlformats.org/presentationml/2006/main">
-  <p:tag name="THINKCELLSHAPEDONOTDELETE" val="pEah0kzfWjEqDJbQr9LzaPQ"/>
+  <p:tag name="THINKCELLSHAPEDONOTDELETE" val="pSB_EKXhVWU6_pOvip5VY6Q"/>
 </p:tagLst>
 </file>
 
@@ -17196,7 +16807,7 @@
 
 <file path=ppt/tags/tag22.xml><?xml version="1.0" encoding="utf-8"?>
 <p:tagLst xmlns:a="http://schemas.openxmlformats.org/drawingml/2006/main" xmlns:r="http://schemas.openxmlformats.org/officeDocument/2006/relationships" xmlns:p="http://schemas.openxmlformats.org/presentationml/2006/main">
-  <p:tag name="THINKCELLSHAPEDONOTDELETE" val="pSB_EKXhVWU6_pOvip5VY6Q"/>
+  <p:tag name="THINKCELLSHAPEDONOTDELETE" val="pEah0kzfWjEqDJbQr9LzaPQ"/>
 </p:tagLst>
 </file>
 
@@ -17208,7 +16819,7 @@
 
 <file path=ppt/tags/tag24.xml><?xml version="1.0" encoding="utf-8"?>
 <p:tagLst xmlns:a="http://schemas.openxmlformats.org/drawingml/2006/main" xmlns:r="http://schemas.openxmlformats.org/officeDocument/2006/relationships" xmlns:p="http://schemas.openxmlformats.org/presentationml/2006/main">
-  <p:tag name="THINKCELLSHAPEDONOTDELETE" val="pEah0kzfWjEqDJbQr9LzaPQ"/>
+  <p:tag name="THINKCELLSHAPEDONOTDELETE" val="pSB_EKXhVWU6_pOvip5VY6Q"/>
 </p:tagLst>
 </file>
 
@@ -17309,12 +16920,6 @@
 </file>
 
 <file path=ppt/tags/tag4.xml><?xml version="1.0" encoding="utf-8"?>
-<p:tagLst xmlns:a="http://schemas.openxmlformats.org/drawingml/2006/main" xmlns:r="http://schemas.openxmlformats.org/officeDocument/2006/relationships" xmlns:p="http://schemas.openxmlformats.org/presentationml/2006/main">
-  <p:tag name="THINKCELLSHAPEDONOTDELETE" val="pSB_EKXhVWU6_pOvip5VY6Q"/>
-</p:tagLst>
-</file>
-
-<file path=ppt/tags/tag40.xml><?xml version="1.0" encoding="utf-8"?>
 <p:tagLst xmlns:a="http://schemas.openxmlformats.org/drawingml/2006/main" xmlns:r="http://schemas.openxmlformats.org/officeDocument/2006/relationships" xmlns:p="http://schemas.openxmlformats.org/presentationml/2006/main">
   <p:tag name="THINKCELLSHAPEDONOTDELETE" val="pSB_EKXhVWU6_pOvip5VY6Q"/>
 </p:tagLst>

</xml_diff>